<commit_message>
SC-230: Parse picture of Master slide
</commit_message>
<xml_diff>
--- a/ShapeCrawler.Tests/Resource/Pictures/pictures-case001.pptx
+++ b/ShapeCrawler.Tests/Resource/Pictures/pictures-case001.pptx
@@ -104,6 +104,11 @@
       </a:defRPr>
     </a:lvl9pPr>
   </p:defaultTextStyle>
+  <p:extLst>
+    <p:ext uri="{EFAFB233-063F-42B5-8137-9DF3F51BA10A}">
+      <p15:sldGuideLst xmlns:p15="http://schemas.microsoft.com/office/powerpoint/2012/main"/>
+    </p:ext>
+  </p:extLst>
 </p:presentation>
 </file>
 
@@ -217,7 +222,7 @@
           <a:p>
             <a:fld id="{501387F0-870F-4344-9893-46495C9A3C2A}" type="datetimeFigureOut">
               <a:rPr lang="en-US" smtClean="0"/>
-              <a:t>3/18/2022</a:t>
+              <a:t>3/19/2022</a:t>
             </a:fld>
             <a:endParaRPr lang="en-US"/>
           </a:p>
@@ -451,7 +456,7 @@
           <a:p>
             <a:fld id="{501387F0-870F-4344-9893-46495C9A3C2A}" type="datetimeFigureOut">
               <a:rPr lang="en-US" smtClean="0"/>
-              <a:t>3/18/2022</a:t>
+              <a:t>3/19/2022</a:t>
             </a:fld>
             <a:endParaRPr lang="en-US"/>
           </a:p>
@@ -659,7 +664,7 @@
           <a:p>
             <a:fld id="{501387F0-870F-4344-9893-46495C9A3C2A}" type="datetimeFigureOut">
               <a:rPr lang="en-US" smtClean="0"/>
-              <a:t>3/18/2022</a:t>
+              <a:t>3/19/2022</a:t>
             </a:fld>
             <a:endParaRPr lang="en-US"/>
           </a:p>
@@ -857,7 +862,7 @@
           <a:p>
             <a:fld id="{501387F0-870F-4344-9893-46495C9A3C2A}" type="datetimeFigureOut">
               <a:rPr lang="en-US" smtClean="0"/>
-              <a:t>3/18/2022</a:t>
+              <a:t>3/19/2022</a:t>
             </a:fld>
             <a:endParaRPr lang="en-US"/>
           </a:p>
@@ -1132,7 +1137,7 @@
           <a:p>
             <a:fld id="{501387F0-870F-4344-9893-46495C9A3C2A}" type="datetimeFigureOut">
               <a:rPr lang="en-US" smtClean="0"/>
-              <a:t>3/18/2022</a:t>
+              <a:t>3/19/2022</a:t>
             </a:fld>
             <a:endParaRPr lang="en-US"/>
           </a:p>
@@ -1397,7 +1402,7 @@
           <a:p>
             <a:fld id="{501387F0-870F-4344-9893-46495C9A3C2A}" type="datetimeFigureOut">
               <a:rPr lang="en-US" smtClean="0"/>
-              <a:t>3/18/2022</a:t>
+              <a:t>3/19/2022</a:t>
             </a:fld>
             <a:endParaRPr lang="en-US"/>
           </a:p>
@@ -1809,7 +1814,7 @@
           <a:p>
             <a:fld id="{501387F0-870F-4344-9893-46495C9A3C2A}" type="datetimeFigureOut">
               <a:rPr lang="en-US" smtClean="0"/>
-              <a:t>3/18/2022</a:t>
+              <a:t>3/19/2022</a:t>
             </a:fld>
             <a:endParaRPr lang="en-US"/>
           </a:p>
@@ -1950,7 +1955,7 @@
           <a:p>
             <a:fld id="{501387F0-870F-4344-9893-46495C9A3C2A}" type="datetimeFigureOut">
               <a:rPr lang="en-US" smtClean="0"/>
-              <a:t>3/18/2022</a:t>
+              <a:t>3/19/2022</a:t>
             </a:fld>
             <a:endParaRPr lang="en-US"/>
           </a:p>
@@ -2063,7 +2068,7 @@
           <a:p>
             <a:fld id="{501387F0-870F-4344-9893-46495C9A3C2A}" type="datetimeFigureOut">
               <a:rPr lang="en-US" smtClean="0"/>
-              <a:t>3/18/2022</a:t>
+              <a:t>3/19/2022</a:t>
             </a:fld>
             <a:endParaRPr lang="en-US"/>
           </a:p>
@@ -2374,7 +2379,7 @@
           <a:p>
             <a:fld id="{501387F0-870F-4344-9893-46495C9A3C2A}" type="datetimeFigureOut">
               <a:rPr lang="en-US" smtClean="0"/>
-              <a:t>3/18/2022</a:t>
+              <a:t>3/19/2022</a:t>
             </a:fld>
             <a:endParaRPr lang="en-US"/>
           </a:p>
@@ -2662,7 +2667,7 @@
           <a:p>
             <a:fld id="{501387F0-870F-4344-9893-46495C9A3C2A}" type="datetimeFigureOut">
               <a:rPr lang="en-US" smtClean="0"/>
-              <a:t>3/18/2022</a:t>
+              <a:t>3/19/2022</a:t>
             </a:fld>
             <a:endParaRPr lang="en-US"/>
           </a:p>
@@ -2814,7 +2819,7 @@
         <p:spPr>
           <a:xfrm>
             <a:off x="838200" y="1825625"/>
-            <a:ext cx="10515600" cy="4351338"/>
+            <a:ext cx="10515600" cy="2513462"/>
           </a:xfrm>
           <a:prstGeom prst="rect">
             <a:avLst/>
@@ -2903,7 +2908,7 @@
           <a:p>
             <a:fld id="{501387F0-870F-4344-9893-46495C9A3C2A}" type="datetimeFigureOut">
               <a:rPr lang="en-US" smtClean="0"/>
-              <a:t>3/18/2022</a:t>
+              <a:t>3/19/2022</a:t>
             </a:fld>
             <a:endParaRPr lang="en-US"/>
           </a:p>
@@ -2999,6 +3004,42 @@
           </a:p>
         </p:txBody>
       </p:sp>
+      <p:pic>
+        <p:nvPicPr>
+          <p:cNvPr id="10" name="Picture 9" descr="Diagram&#10;&#10;Description automatically generated">
+            <a:extLst>
+              <a:ext uri="{FF2B5EF4-FFF2-40B4-BE49-F238E27FC236}">
+                <a16:creationId xmlns:a16="http://schemas.microsoft.com/office/drawing/2014/main" id="{CA93DFC6-9A1E-43A3-846F-201F7DD4C0A2}"/>
+              </a:ext>
+            </a:extLst>
+          </p:cNvPr>
+          <p:cNvPicPr>
+            <a:picLocks noChangeAspect="1"/>
+          </p:cNvPicPr>
+          <p:nvPr userDrawn="1"/>
+        </p:nvPicPr>
+        <p:blipFill>
+          <a:blip r:embed="rId13">
+            <a:extLst>
+              <a:ext uri="{28A0092B-C50C-407E-A947-70E740481C1C}">
+                <a14:useLocalDpi xmlns:a14="http://schemas.microsoft.com/office/drawing/2010/main" val="0"/>
+              </a:ext>
+            </a:extLst>
+          </a:blip>
+          <a:stretch>
+            <a:fillRect/>
+          </a:stretch>
+        </p:blipFill>
+        <p:spPr>
+          <a:xfrm>
+            <a:off x="838200" y="4675277"/>
+            <a:ext cx="6201853" cy="1198952"/>
+          </a:xfrm>
+          <a:prstGeom prst="rect">
+            <a:avLst/>
+          </a:prstGeom>
+        </p:spPr>
+      </p:pic>
     </p:spTree>
     <p:extLst>
       <p:ext uri="{BB962C8B-B14F-4D97-AF65-F5344CB8AC3E}">

</xml_diff>